<commit_message>
Fix pour diagrammes Mermaid
</commit_message>
<xml_diff>
--- a/gemini/corporate/presentation_corporate.pptx
+++ b/gemini/corporate/presentation_corporate.pptx
@@ -4354,6 +4354,33 @@
             <a:r>
               <a:rPr/>
               <a:t>Diagramme de Gantt Mermaid.</a:t>
+            </a:r>
+          </a:p>
+          <a:p>
+            <a:pPr lvl="0" indent="0">
+              <a:buNone/>
+            </a:pPr>
+            <a:r>
+              <a:rPr>
+                <a:latin typeface="Courier"/>
+              </a:rPr>
+              <a:t>gantt
+    dateFormat  YYYY-MM-DD
+    title Roadmap de Déploiement IA Locale
+    section Phase 1: POC &amp; Validation Technique
+    Sélection Cas d'Usage           :a1, 2025-11-01, 14d
+    Mise en place Infra             :a2, after a1, 10d
+    Développement POC               :a3, after a2, 20d
+    Tests &amp; Validation              :a4, after a3, 7d
+    section Phase 2: Pilote &amp; Intégration
+    Intégration Systèmes Existants  :b1, 2025-12-15, 20d
+    Formation Utilisateurs Clés     :b2, after b1, 10d
+    Collecte Feedback               :b3, after b2, 15d
+    Ajustements                     :b4, after b3, 7d
+    section Phase 3: Déploiement Généralisé &amp; Optimisation
+    Déploiement à Grande Échelle    :c1, 2026-02-01, 30d
+    Monitoring &amp; Maintenance        :c2, after c1, 15d
+    Optimisation Continue           :c3, after c2, 10d</a:t>
             </a:r>
           </a:p>
         </p:txBody>

</xml_diff>

<commit_message>
ajout de la génération pdf
</commit_message>
<xml_diff>
--- a/gemini/corporate/presentation_corporate.pptx
+++ b/gemini/corporate/presentation_corporate.pptx
@@ -319,7 +319,7 @@
           <a:p>
             <a:fld id="{241EB5C9-1307-BA42-ABA2-0BC069CD8E7F}" type="datetimeFigureOut">
               <a:rPr lang="en-US" smtClean="0"/>
-              <a:t>1/2/22</a:t>
+              <a:t>10/26/25</a:t>
             </a:fld>
             <a:endParaRPr lang="en-US"/>
           </a:p>
@@ -361,7 +361,7 @@
           <a:p>
             <a:fld id="{C5EF2332-01BF-834F-8236-50238282D533}" type="slidenum">
               <a:rPr lang="en-US" smtClean="0"/>
-              <a:t>‹#›</a:t>
+              <a:t>‹N°›</a:t>
             </a:fld>
             <a:endParaRPr lang="en-US"/>
           </a:p>
@@ -487,7 +487,7 @@
           <a:p>
             <a:fld id="{241EB5C9-1307-BA42-ABA2-0BC069CD8E7F}" type="datetimeFigureOut">
               <a:rPr lang="en-US" smtClean="0"/>
-              <a:t>1/2/22</a:t>
+              <a:t>10/26/25</a:t>
             </a:fld>
             <a:endParaRPr lang="en-US"/>
           </a:p>
@@ -529,7 +529,7 @@
           <a:p>
             <a:fld id="{C5EF2332-01BF-834F-8236-50238282D533}" type="slidenum">
               <a:rPr lang="en-US" smtClean="0"/>
-              <a:t>‹#›</a:t>
+              <a:t>‹N°›</a:t>
             </a:fld>
             <a:endParaRPr lang="en-US"/>
           </a:p>
@@ -665,7 +665,7 @@
           <a:p>
             <a:fld id="{241EB5C9-1307-BA42-ABA2-0BC069CD8E7F}" type="datetimeFigureOut">
               <a:rPr lang="en-US" smtClean="0"/>
-              <a:t>1/2/22</a:t>
+              <a:t>10/26/25</a:t>
             </a:fld>
             <a:endParaRPr lang="en-US"/>
           </a:p>
@@ -707,7 +707,7 @@
           <a:p>
             <a:fld id="{C5EF2332-01BF-834F-8236-50238282D533}" type="slidenum">
               <a:rPr lang="en-US" smtClean="0"/>
-              <a:t>‹#›</a:t>
+              <a:t>‹N°›</a:t>
             </a:fld>
             <a:endParaRPr lang="en-US"/>
           </a:p>
@@ -833,7 +833,7 @@
           <a:p>
             <a:fld id="{241EB5C9-1307-BA42-ABA2-0BC069CD8E7F}" type="datetimeFigureOut">
               <a:rPr lang="en-US" smtClean="0"/>
-              <a:t>1/2/22</a:t>
+              <a:t>10/26/25</a:t>
             </a:fld>
             <a:endParaRPr lang="en-US"/>
           </a:p>
@@ -875,7 +875,7 @@
           <a:p>
             <a:fld id="{C5EF2332-01BF-834F-8236-50238282D533}" type="slidenum">
               <a:rPr lang="en-US" smtClean="0"/>
-              <a:t>‹#›</a:t>
+              <a:t>‹N°›</a:t>
             </a:fld>
             <a:endParaRPr lang="en-US"/>
           </a:p>
@@ -1078,7 +1078,7 @@
           <a:p>
             <a:fld id="{241EB5C9-1307-BA42-ABA2-0BC069CD8E7F}" type="datetimeFigureOut">
               <a:rPr lang="en-US" smtClean="0"/>
-              <a:t>1/2/22</a:t>
+              <a:t>10/26/25</a:t>
             </a:fld>
             <a:endParaRPr lang="en-US"/>
           </a:p>
@@ -1120,7 +1120,7 @@
           <a:p>
             <a:fld id="{C5EF2332-01BF-834F-8236-50238282D533}" type="slidenum">
               <a:rPr lang="en-US" smtClean="0"/>
-              <a:t>‹#›</a:t>
+              <a:t>‹N°›</a:t>
             </a:fld>
             <a:endParaRPr lang="en-US"/>
           </a:p>
@@ -1363,7 +1363,7 @@
           <a:p>
             <a:fld id="{241EB5C9-1307-BA42-ABA2-0BC069CD8E7F}" type="datetimeFigureOut">
               <a:rPr lang="en-US" smtClean="0"/>
-              <a:t>1/2/22</a:t>
+              <a:t>10/26/25</a:t>
             </a:fld>
             <a:endParaRPr lang="en-US"/>
           </a:p>
@@ -1405,7 +1405,7 @@
           <a:p>
             <a:fld id="{C5EF2332-01BF-834F-8236-50238282D533}" type="slidenum">
               <a:rPr lang="en-US" smtClean="0"/>
-              <a:t>‹#›</a:t>
+              <a:t>‹N°›</a:t>
             </a:fld>
             <a:endParaRPr lang="en-US"/>
           </a:p>
@@ -1782,7 +1782,7 @@
           <a:p>
             <a:fld id="{241EB5C9-1307-BA42-ABA2-0BC069CD8E7F}" type="datetimeFigureOut">
               <a:rPr lang="en-US" smtClean="0"/>
-              <a:t>1/2/22</a:t>
+              <a:t>10/26/25</a:t>
             </a:fld>
             <a:endParaRPr lang="en-US"/>
           </a:p>
@@ -1824,7 +1824,7 @@
           <a:p>
             <a:fld id="{C5EF2332-01BF-834F-8236-50238282D533}" type="slidenum">
               <a:rPr lang="en-US" smtClean="0"/>
-              <a:t>‹#›</a:t>
+              <a:t>‹N°›</a:t>
             </a:fld>
             <a:endParaRPr lang="en-US"/>
           </a:p>
@@ -1899,7 +1899,7 @@
           <a:p>
             <a:fld id="{241EB5C9-1307-BA42-ABA2-0BC069CD8E7F}" type="datetimeFigureOut">
               <a:rPr lang="en-US" smtClean="0"/>
-              <a:t>1/2/22</a:t>
+              <a:t>10/26/25</a:t>
             </a:fld>
             <a:endParaRPr lang="en-US"/>
           </a:p>
@@ -1941,7 +1941,7 @@
           <a:p>
             <a:fld id="{C5EF2332-01BF-834F-8236-50238282D533}" type="slidenum">
               <a:rPr lang="en-US" smtClean="0"/>
-              <a:t>‹#›</a:t>
+              <a:t>‹N°›</a:t>
             </a:fld>
             <a:endParaRPr lang="en-US"/>
           </a:p>
@@ -1994,7 +1994,7 @@
           <a:p>
             <a:fld id="{241EB5C9-1307-BA42-ABA2-0BC069CD8E7F}" type="datetimeFigureOut">
               <a:rPr lang="en-US" smtClean="0"/>
-              <a:t>1/2/22</a:t>
+              <a:t>10/26/25</a:t>
             </a:fld>
             <a:endParaRPr lang="en-US"/>
           </a:p>
@@ -2036,7 +2036,7 @@
           <a:p>
             <a:fld id="{C5EF2332-01BF-834F-8236-50238282D533}" type="slidenum">
               <a:rPr lang="en-US" smtClean="0"/>
-              <a:t>‹#›</a:t>
+              <a:t>‹N°›</a:t>
             </a:fld>
             <a:endParaRPr lang="en-US"/>
           </a:p>
@@ -2269,7 +2269,7 @@
           <a:p>
             <a:fld id="{241EB5C9-1307-BA42-ABA2-0BC069CD8E7F}" type="datetimeFigureOut">
               <a:rPr lang="en-US" smtClean="0"/>
-              <a:t>1/2/22</a:t>
+              <a:t>10/26/25</a:t>
             </a:fld>
             <a:endParaRPr lang="en-US"/>
           </a:p>
@@ -2311,7 +2311,7 @@
           <a:p>
             <a:fld id="{C5EF2332-01BF-834F-8236-50238282D533}" type="slidenum">
               <a:rPr lang="en-US" smtClean="0"/>
-              <a:t>‹#›</a:t>
+              <a:t>‹N°›</a:t>
             </a:fld>
             <a:endParaRPr lang="en-US"/>
           </a:p>
@@ -2521,7 +2521,7 @@
           <a:p>
             <a:fld id="{241EB5C9-1307-BA42-ABA2-0BC069CD8E7F}" type="datetimeFigureOut">
               <a:rPr lang="en-US" smtClean="0"/>
-              <a:t>1/2/22</a:t>
+              <a:t>10/26/25</a:t>
             </a:fld>
             <a:endParaRPr lang="en-US"/>
           </a:p>
@@ -2563,7 +2563,7 @@
           <a:p>
             <a:fld id="{C5EF2332-01BF-834F-8236-50238282D533}" type="slidenum">
               <a:rPr lang="en-US" smtClean="0"/>
-              <a:t>‹#›</a:t>
+              <a:t>‹N°›</a:t>
             </a:fld>
             <a:endParaRPr lang="en-US"/>
           </a:p>
@@ -2732,7 +2732,7 @@
           <a:p>
             <a:fld id="{241EB5C9-1307-BA42-ABA2-0BC069CD8E7F}" type="datetimeFigureOut">
               <a:rPr lang="en-US" smtClean="0"/>
-              <a:t>1/2/22</a:t>
+              <a:t>10/26/25</a:t>
             </a:fld>
             <a:endParaRPr lang="en-US"/>
           </a:p>
@@ -2810,7 +2810,7 @@
           <a:p>
             <a:fld id="{C5EF2332-01BF-834F-8236-50238282D533}" type="slidenum">
               <a:rPr lang="en-US" smtClean="0"/>
-              <a:t>‹#›</a:t>
+              <a:t>‹N°›</a:t>
             </a:fld>
             <a:endParaRPr lang="en-US"/>
           </a:p>
@@ -4683,42 +4683,42 @@
 <file path=ppt/theme/theme1.xml><?xml version="1.0" encoding="utf-8"?>
 <a:theme xmlns:a="http://schemas.openxmlformats.org/drawingml/2006/main" name="Office Theme">
   <a:themeElements>
-    <a:clrScheme name="Office">
+    <a:clrScheme name=" 1">
       <a:dk1>
-        <a:sysClr val="windowText" lastClr="000000"/>
+        <a:srgbClr val="1C2833"/>
       </a:dk1>
       <a:lt1>
-        <a:sysClr val="window" lastClr="FFFFFF"/>
+        <a:srgbClr val="FFFFFF"/>
       </a:lt1>
       <a:dk2>
-        <a:srgbClr val="1F497D"/>
+        <a:srgbClr val="44546A"/>
       </a:dk2>
       <a:lt2>
-        <a:srgbClr val="EEECE1"/>
+        <a:srgbClr val="E7E6E6"/>
       </a:lt2>
       <a:accent1>
-        <a:srgbClr val="4F81BD"/>
+        <a:srgbClr val="3498DB"/>
       </a:accent1>
       <a:accent2>
-        <a:srgbClr val="C0504D"/>
+        <a:srgbClr val="FE4447"/>
       </a:accent2>
       <a:accent3>
-        <a:srgbClr val="9BBB59"/>
+        <a:srgbClr val="277883"/>
       </a:accent3>
       <a:accent4>
-        <a:srgbClr val="8064A2"/>
+        <a:srgbClr val="FFC000"/>
       </a:accent4>
       <a:accent5>
-        <a:srgbClr val="4BACC6"/>
+        <a:srgbClr val="5B9BD5"/>
       </a:accent5>
       <a:accent6>
-        <a:srgbClr val="F79646"/>
+        <a:srgbClr val="70AD47"/>
       </a:accent6>
       <a:hlink>
-        <a:srgbClr val="0000FF"/>
+        <a:srgbClr val="0563C1"/>
       </a:hlink>
       <a:folHlink>
-        <a:srgbClr val="800080"/>
+        <a:srgbClr val="954F72"/>
       </a:folHlink>
     </a:clrScheme>
     <a:fontScheme name="Office">
@@ -5001,7 +5001,7 @@
 </file>
 
 <file path=ppt/theme/theme2.xml><?xml version="1.0" encoding="utf-8"?>
-<a:theme xmlns:a="http://schemas.openxmlformats.org/drawingml/2006/main" name="Office Theme">
+<a:theme xmlns:a="http://schemas.openxmlformats.org/drawingml/2006/main" name="Thème Office">
   <a:themeElements>
     <a:clrScheme name="Office">
       <a:dk1>
@@ -5017,7 +5017,7 @@
         <a:srgbClr val="E7E6E6"/>
       </a:lt2>
       <a:accent1>
-        <a:srgbClr val="5B9BD5"/>
+        <a:srgbClr val="4472C4"/>
       </a:accent1>
       <a:accent2>
         <a:srgbClr val="ED7D31"/>
@@ -5029,7 +5029,7 @@
         <a:srgbClr val="FFC000"/>
       </a:accent4>
       <a:accent5>
-        <a:srgbClr val="4472C4"/>
+        <a:srgbClr val="5B9BD5"/>
       </a:accent5>
       <a:accent6>
         <a:srgbClr val="70AD47"/>
@@ -5046,9 +5046,9 @@
         <a:latin typeface="Calibri Light" panose="020F0302020204030204"/>
         <a:ea typeface=""/>
         <a:cs typeface=""/>
-        <a:font script="Jpan" typeface="ＭＳ Ｐゴシック"/>
+        <a:font script="Jpan" typeface="游ゴシック Light"/>
         <a:font script="Hang" typeface="맑은 고딕"/>
-        <a:font script="Hans" typeface="宋体"/>
+        <a:font script="Hans" typeface="等线 Light"/>
         <a:font script="Hant" typeface="新細明體"/>
         <a:font script="Arab" typeface="Times New Roman"/>
         <a:font script="Hebr" typeface="Times New Roman"/>
@@ -5076,14 +5076,31 @@
         <a:font script="Viet" typeface="Times New Roman"/>
         <a:font script="Uigh" typeface="Microsoft Uighur"/>
         <a:font script="Geor" typeface="Sylfaen"/>
+        <a:font script="Armn" typeface="Arial"/>
+        <a:font script="Bugi" typeface="Leelawadee UI"/>
+        <a:font script="Bopo" typeface="Microsoft JhengHei"/>
+        <a:font script="Java" typeface="Javanese Text"/>
+        <a:font script="Lisu" typeface="Segoe UI"/>
+        <a:font script="Mymr" typeface="Myanmar Text"/>
+        <a:font script="Nkoo" typeface="Ebrima"/>
+        <a:font script="Olck" typeface="Nirmala UI"/>
+        <a:font script="Osma" typeface="Ebrima"/>
+        <a:font script="Phag" typeface="Phagspa"/>
+        <a:font script="Syrn" typeface="Estrangelo Edessa"/>
+        <a:font script="Syrj" typeface="Estrangelo Edessa"/>
+        <a:font script="Syre" typeface="Estrangelo Edessa"/>
+        <a:font script="Sora" typeface="Nirmala UI"/>
+        <a:font script="Tale" typeface="Microsoft Tai Le"/>
+        <a:font script="Talu" typeface="Microsoft New Tai Lue"/>
+        <a:font script="Tfng" typeface="Ebrima"/>
       </a:majorFont>
       <a:minorFont>
         <a:latin typeface="Calibri" panose="020F0502020204030204"/>
         <a:ea typeface=""/>
         <a:cs typeface=""/>
-        <a:font script="Jpan" typeface="ＭＳ Ｐゴシック"/>
+        <a:font script="Jpan" typeface="游ゴシック"/>
         <a:font script="Hang" typeface="맑은 고딕"/>
-        <a:font script="Hans" typeface="宋体"/>
+        <a:font script="Hans" typeface="等线"/>
         <a:font script="Hant" typeface="新細明體"/>
         <a:font script="Arab" typeface="Arial"/>
         <a:font script="Hebr" typeface="Arial"/>
@@ -5111,6 +5128,23 @@
         <a:font script="Viet" typeface="Arial"/>
         <a:font script="Uigh" typeface="Microsoft Uighur"/>
         <a:font script="Geor" typeface="Sylfaen"/>
+        <a:font script="Armn" typeface="Arial"/>
+        <a:font script="Bugi" typeface="Leelawadee UI"/>
+        <a:font script="Bopo" typeface="Microsoft JhengHei"/>
+        <a:font script="Java" typeface="Javanese Text"/>
+        <a:font script="Lisu" typeface="Segoe UI"/>
+        <a:font script="Mymr" typeface="Myanmar Text"/>
+        <a:font script="Nkoo" typeface="Ebrima"/>
+        <a:font script="Olck" typeface="Nirmala UI"/>
+        <a:font script="Osma" typeface="Ebrima"/>
+        <a:font script="Phag" typeface="Phagspa"/>
+        <a:font script="Syrn" typeface="Estrangelo Edessa"/>
+        <a:font script="Syrj" typeface="Estrangelo Edessa"/>
+        <a:font script="Syre" typeface="Estrangelo Edessa"/>
+        <a:font script="Sora" typeface="Nirmala UI"/>
+        <a:font script="Tale" typeface="Microsoft Tai Le"/>
+        <a:font script="Talu" typeface="Microsoft New Tai Lue"/>
+        <a:font script="Tfng" typeface="Ebrima"/>
       </a:minorFont>
     </a:fontScheme>
     <a:fmtScheme name="Office">

</xml_diff>